<commit_message>
Added new Spark lab
</commit_message>
<xml_diff>
--- a/Content/Big Data/Azure HDInsight.pptx
+++ b/Content/Big Data/Azure HDInsight.pptx
@@ -5,17 +5,20 @@
     <p:sldMasterId id="2147483680" r:id="rId1"/>
   </p:sldMasterIdLst>
   <p:notesMasterIdLst>
-    <p:notesMasterId r:id="rId10"/>
+    <p:notesMasterId r:id="rId13"/>
   </p:notesMasterIdLst>
   <p:sldIdLst>
     <p:sldId id="256" r:id="rId2"/>
     <p:sldId id="261" r:id="rId3"/>
     <p:sldId id="259" r:id="rId4"/>
-    <p:sldId id="264" r:id="rId5"/>
-    <p:sldId id="268" r:id="rId6"/>
-    <p:sldId id="266" r:id="rId7"/>
-    <p:sldId id="267" r:id="rId8"/>
-    <p:sldId id="265" r:id="rId9"/>
+    <p:sldId id="269" r:id="rId5"/>
+    <p:sldId id="264" r:id="rId6"/>
+    <p:sldId id="268" r:id="rId7"/>
+    <p:sldId id="272" r:id="rId8"/>
+    <p:sldId id="271" r:id="rId9"/>
+    <p:sldId id="266" r:id="rId10"/>
+    <p:sldId id="267" r:id="rId11"/>
+    <p:sldId id="265" r:id="rId12"/>
   </p:sldIdLst>
   <p:sldSz cx="12192000" cy="6858000"/>
   <p:notesSz cx="6858000" cy="9144000"/>
@@ -215,7 +218,7 @@
           <a:p>
             <a:fld id="{2E5CA586-3557-4985-BCD4-35EF5AC8B4A4}" type="datetimeFigureOut">
               <a:rPr lang="en-US" smtClean="0"/>
-              <a:t>3/9/2016</a:t>
+              <a:t>5/27/2016</a:t>
             </a:fld>
             <a:endParaRPr lang="en-US"/>
           </a:p>
@@ -613,7 +616,7 @@
           <a:p>
             <a:r>
               <a:rPr lang="en-US" dirty="0" smtClean="0"/>
-              <a:t>RE: "Commodity hardware." Hadoop assumes that hardware failures are common and should be handled automatically by the framework.</a:t>
+              <a:t>Apache Hive is a data warehouse infrastructure built on top of Hadoop for providing data summarization, query, and analysis. Initially developed by Facebook, Apache Hive is now used and developed by other companies such as Netflix. Amazon maintains a software fork of Apache Hive that is included in Amazon Elastic MapReduce on Amazon Web Services</a:t>
             </a:r>
           </a:p>
           <a:p>
@@ -622,7 +625,11 @@
           <a:p>
             <a:r>
               <a:rPr lang="en-US" dirty="0" smtClean="0"/>
-              <a:t>Apache Hive is a data warehouse infrastructure built on top of Hadoop for providing data summarization, query, and analysis. Initially developed by Facebook, Apache Hive is now used and developed by other companies such as Netflix. Amazon maintains a software fork of Apache Hive that is included in Amazon Elastic MapReduce on Amazon Web Services</a:t>
+              <a:t>NOTE: Removed “Linux and Windows because of Spark’s decision to remove Windows support.  Probably worth</a:t>
+            </a:r>
+            <a:r>
+              <a:rPr lang="en-US" baseline="0" dirty="0" smtClean="0"/>
+              <a:t> de-emphasizing the OS and instead focusing on the HDI platforms offered.</a:t>
             </a:r>
             <a:endParaRPr lang="en-US" dirty="0"/>
           </a:p>
@@ -709,72 +716,70 @@
           <a:lstStyle/>
           <a:p>
             <a:r>
-              <a:rPr lang="en-US" dirty="0" smtClean="0">
-                <a:effectLst/>
-              </a:rPr>
-              <a:t>Apache Spark is a fast, in-memory data processing engine with elegant and expressive development APIs in Scala, Java, Python, and R that allow data workers to efficiently execute machine learning algorithms that require fast iterative access to datasets. Spark on Apache Hadoop YARN enables deep integration with Hadoop and other YARN enabled workloads in the enterprise.</a:t>
-            </a:r>
-          </a:p>
-          <a:p>
-            <a:endParaRPr lang="en-US" dirty="0" smtClean="0">
-              <a:effectLst/>
-            </a:endParaRPr>
-          </a:p>
-          <a:p>
-            <a:r>
               <a:rPr lang="en-US" dirty="0" smtClean="0"/>
-              <a:t>At the core of Spark is the notion of a Resilient Distributed Dataset (RDD), which is an immutable collection of objects that is partitioned and distributed across multiple physical nodes of a YARN cluster and that can be operated in parallel.</a:t>
+              <a:t>Source: https://azure.microsoft.com/en-us/documentation/articles/hdinsight-hadoop-introduction/ (Advantages of Hadoop in the Cloud)</a:t>
+            </a:r>
+          </a:p>
+          <a:p>
+            <a:endParaRPr lang="en-US" dirty="0" smtClean="0"/>
+          </a:p>
+          <a:p>
+            <a:r>
+              <a:rPr lang="en-US" dirty="0" smtClean="0"/>
+              <a:t>What would it take for YOU to manage a 500-node cluster?</a:t>
             </a:r>
             <a:r>
               <a:rPr lang="en-US" baseline="0" dirty="0" smtClean="0"/>
-              <a:t> </a:t>
+              <a:t>  How many resources, how much work in checking node health, </a:t>
+            </a:r>
+            <a:r>
+              <a:rPr lang="en-US" baseline="0" dirty="0" err="1" smtClean="0"/>
+              <a:t>etc</a:t>
+            </a:r>
+            <a:r>
+              <a:rPr lang="en-US" baseline="0" dirty="0" smtClean="0"/>
+              <a:t>?</a:t>
+            </a:r>
+          </a:p>
+          <a:p>
+            <a:endParaRPr lang="en-US" baseline="0" dirty="0" smtClean="0"/>
+          </a:p>
+          <a:p>
+            <a:pPr marL="0" marR="0" lvl="1" indent="0" algn="l" defTabSz="914400" rtl="0" eaLnBrk="1" fontAlgn="auto" latinLnBrk="0" hangingPunct="1">
+              <a:lnSpc>
+                <a:spcPct val="100000"/>
+              </a:lnSpc>
+              <a:spcBef>
+                <a:spcPts val="0"/>
+              </a:spcBef>
+              <a:spcAft>
+                <a:spcPts val="0"/>
+              </a:spcAft>
+              <a:buClrTx/>
+              <a:buSzTx/>
+              <a:buFontTx/>
+              <a:buNone/>
+              <a:tabLst/>
+              <a:defRPr/>
+            </a:pPr>
+            <a:r>
+              <a:rPr lang="en-US" baseline="0" dirty="0" smtClean="0"/>
+              <a:t>Note about HDFS: </a:t>
             </a:r>
             <a:r>
               <a:rPr lang="en-US" dirty="0" smtClean="0"/>
-              <a:t>Typically, RDDs are instantiated by loading data from a shared filesystem, HDFS, </a:t>
+              <a:t>Most HDFS commands work (except OS-specific ones like </a:t>
             </a:r>
             <a:r>
               <a:rPr lang="en-US" dirty="0" err="1" smtClean="0"/>
-              <a:t>HBase</a:t>
+              <a:t>fschk</a:t>
             </a:r>
             <a:r>
               <a:rPr lang="en-US" dirty="0" smtClean="0"/>
-              <a:t>, or any data source offering a Hadoop </a:t>
-            </a:r>
-            <a:r>
-              <a:rPr lang="en-US" dirty="0" err="1" smtClean="0"/>
-              <a:t>InputFormat</a:t>
-            </a:r>
-            <a:r>
-              <a:rPr lang="en-US" dirty="0" smtClean="0"/>
-              <a:t> on a YARN cluster.</a:t>
-            </a:r>
-          </a:p>
-          <a:p>
-            <a:endParaRPr lang="en-US" dirty="0" smtClean="0"/>
-          </a:p>
-          <a:p>
-            <a:r>
-              <a:rPr lang="en-US" dirty="0" smtClean="0"/>
-              <a:t>Once an RDD is instantiated, you can apply a series of operations. All operations fall into one of two types: transformations or actions. Transformation operations, as the name suggests, create new datasets from an existing RDD and build out the processing Directed Acyclic Graph (DAG) that can then be applied on the partitioned dataset across the YARN cluster. An Action operation, on the other hand, executes DAG and returns a value.</a:t>
-            </a:r>
-          </a:p>
-          <a:p>
-            <a:endParaRPr lang="en-US" dirty="0" smtClean="0"/>
-          </a:p>
-          <a:p>
-            <a:r>
-              <a:rPr lang="en-US" dirty="0" smtClean="0"/>
-              <a:t>Spark </a:t>
-            </a:r>
-            <a:r>
-              <a:rPr lang="en-US" dirty="0" smtClean="0"/>
-              <a:t>can perform up to 100 times faster than Hadoop thanks</a:t>
-            </a:r>
-            <a:r>
-              <a:rPr lang="en-US" baseline="0" dirty="0" smtClean="0"/>
-              <a:t> to its in-memory parallel processing model.</a:t>
-            </a:r>
+              <a:t>)</a:t>
+            </a:r>
+          </a:p>
+          <a:p>
             <a:endParaRPr lang="en-US" dirty="0"/>
           </a:p>
         </p:txBody>
@@ -796,7 +801,273 @@
           <a:p>
             <a:fld id="{BC60BE34-BC89-4C98-A56B-79B7A098D024}" type="slidenum">
               <a:rPr lang="en-US" smtClean="0"/>
+              <a:t>4</a:t>
+            </a:fld>
+            <a:endParaRPr lang="en-US"/>
+          </a:p>
+        </p:txBody>
+      </p:sp>
+    </p:spTree>
+    <p:extLst>
+      <p:ext uri="{BB962C8B-B14F-4D97-AF65-F5344CB8AC3E}">
+        <p14:creationId xmlns:p14="http://schemas.microsoft.com/office/powerpoint/2010/main" val="591504895"/>
+      </p:ext>
+    </p:extLst>
+  </p:cSld>
+  <p:clrMapOvr>
+    <a:masterClrMapping/>
+  </p:clrMapOvr>
+</p:notes>
+</file>
+
+<file path=ppt/notesSlides/notesSlide4.xml><?xml version="1.0" encoding="utf-8"?>
+<p:notes xmlns:a="http://schemas.openxmlformats.org/drawingml/2006/main" xmlns:r="http://schemas.openxmlformats.org/officeDocument/2006/relationships" xmlns:p="http://schemas.openxmlformats.org/presentationml/2006/main">
+  <p:cSld>
+    <p:spTree>
+      <p:nvGrpSpPr>
+        <p:cNvPr id="1" name=""/>
+        <p:cNvGrpSpPr/>
+        <p:nvPr/>
+      </p:nvGrpSpPr>
+      <p:grpSpPr>
+        <a:xfrm>
+          <a:off x="0" y="0"/>
+          <a:ext cx="0" cy="0"/>
+          <a:chOff x="0" y="0"/>
+          <a:chExt cx="0" cy="0"/>
+        </a:xfrm>
+      </p:grpSpPr>
+      <p:sp>
+        <p:nvSpPr>
+          <p:cNvPr id="2" name="Slide Image Placeholder 1"/>
+          <p:cNvSpPr>
+            <a:spLocks noGrp="1" noRot="1" noChangeAspect="1"/>
+          </p:cNvSpPr>
+          <p:nvPr>
+            <p:ph type="sldImg"/>
+          </p:nvPr>
+        </p:nvSpPr>
+        <p:spPr/>
+      </p:sp>
+      <p:sp>
+        <p:nvSpPr>
+          <p:cNvPr id="3" name="Notes Placeholder 2"/>
+          <p:cNvSpPr>
+            <a:spLocks noGrp="1"/>
+          </p:cNvSpPr>
+          <p:nvPr>
+            <p:ph type="body" idx="1"/>
+          </p:nvPr>
+        </p:nvSpPr>
+        <p:spPr/>
+        <p:txBody>
+          <a:bodyPr/>
+          <a:lstStyle/>
+          <a:p>
+            <a:endParaRPr lang="en-US" dirty="0"/>
+          </a:p>
+        </p:txBody>
+      </p:sp>
+      <p:sp>
+        <p:nvSpPr>
+          <p:cNvPr id="4" name="Slide Number Placeholder 3"/>
+          <p:cNvSpPr>
+            <a:spLocks noGrp="1"/>
+          </p:cNvSpPr>
+          <p:nvPr>
+            <p:ph type="sldNum" sz="quarter" idx="10"/>
+          </p:nvPr>
+        </p:nvSpPr>
+        <p:spPr/>
+        <p:txBody>
+          <a:bodyPr/>
+          <a:lstStyle/>
+          <a:p>
+            <a:fld id="{BC60BE34-BC89-4C98-A56B-79B7A098D024}" type="slidenum">
+              <a:rPr lang="en-US" smtClean="0"/>
               <a:t>5</a:t>
+            </a:fld>
+            <a:endParaRPr lang="en-US"/>
+          </a:p>
+        </p:txBody>
+      </p:sp>
+    </p:spTree>
+    <p:extLst>
+      <p:ext uri="{BB962C8B-B14F-4D97-AF65-F5344CB8AC3E}">
+        <p14:creationId xmlns:p14="http://schemas.microsoft.com/office/powerpoint/2010/main" val="2714841016"/>
+      </p:ext>
+    </p:extLst>
+  </p:cSld>
+  <p:clrMapOvr>
+    <a:masterClrMapping/>
+  </p:clrMapOvr>
+</p:notes>
+</file>
+
+<file path=ppt/notesSlides/notesSlide5.xml><?xml version="1.0" encoding="utf-8"?>
+<p:notes xmlns:a="http://schemas.openxmlformats.org/drawingml/2006/main" xmlns:r="http://schemas.openxmlformats.org/officeDocument/2006/relationships" xmlns:p="http://schemas.openxmlformats.org/presentationml/2006/main">
+  <p:cSld>
+    <p:spTree>
+      <p:nvGrpSpPr>
+        <p:cNvPr id="1" name=""/>
+        <p:cNvGrpSpPr/>
+        <p:nvPr/>
+      </p:nvGrpSpPr>
+      <p:grpSpPr>
+        <a:xfrm>
+          <a:off x="0" y="0"/>
+          <a:ext cx="0" cy="0"/>
+          <a:chOff x="0" y="0"/>
+          <a:chExt cx="0" cy="0"/>
+        </a:xfrm>
+      </p:grpSpPr>
+      <p:sp>
+        <p:nvSpPr>
+          <p:cNvPr id="2" name="Slide Image Placeholder 1"/>
+          <p:cNvSpPr>
+            <a:spLocks noGrp="1" noRot="1" noChangeAspect="1"/>
+          </p:cNvSpPr>
+          <p:nvPr>
+            <p:ph type="sldImg"/>
+          </p:nvPr>
+        </p:nvSpPr>
+        <p:spPr/>
+      </p:sp>
+      <p:sp>
+        <p:nvSpPr>
+          <p:cNvPr id="3" name="Notes Placeholder 2"/>
+          <p:cNvSpPr>
+            <a:spLocks noGrp="1"/>
+          </p:cNvSpPr>
+          <p:nvPr>
+            <p:ph type="body" idx="1"/>
+          </p:nvPr>
+        </p:nvSpPr>
+        <p:spPr/>
+        <p:txBody>
+          <a:bodyPr/>
+          <a:lstStyle/>
+          <a:p>
+            <a:r>
+              <a:rPr lang="en-US" dirty="0" smtClean="0">
+                <a:effectLst/>
+              </a:rPr>
+              <a:t>Notes – the notions of interactivity</a:t>
+            </a:r>
+            <a:r>
+              <a:rPr lang="en-US" baseline="0" dirty="0" smtClean="0">
+                <a:effectLst/>
+              </a:rPr>
+              <a:t> and immediacy when working with Spark are key/fundamental</a:t>
+            </a:r>
+          </a:p>
+          <a:p>
+            <a:r>
+              <a:rPr lang="en-US" dirty="0" smtClean="0">
+                <a:effectLst/>
+              </a:rPr>
+              <a:t>https://azure.microsoft.com/en-us/documentation/videos/announcing-apache-spark-on-azure-hdinsight/</a:t>
+            </a:r>
+          </a:p>
+          <a:p>
+            <a:r>
+              <a:rPr lang="en-US" dirty="0" smtClean="0">
+                <a:effectLst/>
+              </a:rPr>
+              <a:t>Notes – not *just* fast for in-memory, but also fast for on-disk/larger data sets</a:t>
+            </a:r>
+          </a:p>
+          <a:p>
+            <a:endParaRPr lang="en-US" dirty="0" smtClean="0">
+              <a:effectLst/>
+            </a:endParaRPr>
+          </a:p>
+          <a:p>
+            <a:r>
+              <a:rPr lang="en-US" dirty="0" smtClean="0">
+                <a:effectLst/>
+              </a:rPr>
+              <a:t>Apache Spark is a fast, in-memory data processing engine with elegant and expressive development APIs in Scala, Java, Python, and R that allow data workers to efficiently execute machine learning algorithms that require fast iterative access to datasets. Spark on Apache Hadoop YARN enables deep integration with Hadoop and other YARN enabled workloads in the enterprise.</a:t>
+            </a:r>
+          </a:p>
+          <a:p>
+            <a:endParaRPr lang="en-US" dirty="0" smtClean="0">
+              <a:effectLst/>
+            </a:endParaRPr>
+          </a:p>
+          <a:p>
+            <a:r>
+              <a:rPr lang="en-US" dirty="0" smtClean="0"/>
+              <a:t>At the core of Spark is the notion of a Resilient Distributed Dataset (RDD), which is an immutable collection of objects that is partitioned and distributed across multiple physical nodes of a YARN cluster and that can be operated in parallel.</a:t>
+            </a:r>
+            <a:r>
+              <a:rPr lang="en-US" baseline="0" dirty="0" smtClean="0"/>
+              <a:t> </a:t>
+            </a:r>
+            <a:r>
+              <a:rPr lang="en-US" dirty="0" smtClean="0"/>
+              <a:t>Typically, RDDs are instantiated by loading data from a shared filesystem, HDFS, </a:t>
+            </a:r>
+            <a:r>
+              <a:rPr lang="en-US" dirty="0" err="1" smtClean="0"/>
+              <a:t>HBase</a:t>
+            </a:r>
+            <a:r>
+              <a:rPr lang="en-US" dirty="0" smtClean="0"/>
+              <a:t>, or any data source offering a Hadoop </a:t>
+            </a:r>
+            <a:r>
+              <a:rPr lang="en-US" dirty="0" err="1" smtClean="0"/>
+              <a:t>InputFormat</a:t>
+            </a:r>
+            <a:r>
+              <a:rPr lang="en-US" dirty="0" smtClean="0"/>
+              <a:t> on a YARN cluster.</a:t>
+            </a:r>
+          </a:p>
+          <a:p>
+            <a:endParaRPr lang="en-US" dirty="0" smtClean="0"/>
+          </a:p>
+          <a:p>
+            <a:r>
+              <a:rPr lang="en-US" dirty="0" smtClean="0"/>
+              <a:t>Once an RDD is instantiated, you can apply a series of operations. All operations fall into one of two types: transformations or actions. Transformation operations, as the name suggests, create new datasets from an existing RDD and build out the processing Directed Acyclic Graph (DAG) that can then be applied on the partitioned dataset across the YARN cluster. An Action operation, on the other hand, executes DAG and returns a value.</a:t>
+            </a:r>
+          </a:p>
+          <a:p>
+            <a:endParaRPr lang="en-US" dirty="0" smtClean="0"/>
+          </a:p>
+          <a:p>
+            <a:r>
+              <a:rPr lang="en-US" dirty="0" smtClean="0"/>
+              <a:t>Spark can perform up to 100 times faster than Hadoop thanks</a:t>
+            </a:r>
+            <a:r>
+              <a:rPr lang="en-US" baseline="0" dirty="0" smtClean="0"/>
+              <a:t> to its in-memory parallel processing model.</a:t>
+            </a:r>
+            <a:endParaRPr lang="en-US" dirty="0"/>
+          </a:p>
+        </p:txBody>
+      </p:sp>
+      <p:sp>
+        <p:nvSpPr>
+          <p:cNvPr id="4" name="Slide Number Placeholder 3"/>
+          <p:cNvSpPr>
+            <a:spLocks noGrp="1"/>
+          </p:cNvSpPr>
+          <p:nvPr>
+            <p:ph type="sldNum" sz="quarter" idx="10"/>
+          </p:nvPr>
+        </p:nvSpPr>
+        <p:spPr/>
+        <p:txBody>
+          <a:bodyPr/>
+          <a:lstStyle/>
+          <a:p>
+            <a:fld id="{BC60BE34-BC89-4C98-A56B-79B7A098D024}" type="slidenum">
+              <a:rPr lang="en-US" smtClean="0"/>
+              <a:t>6</a:t>
             </a:fld>
             <a:endParaRPr lang="en-US"/>
           </a:p>
@@ -11692,6 +11963,165 @@
 </p:sld>
 </file>
 
+<file path=ppt/slides/slide10.xml><?xml version="1.0" encoding="utf-8"?>
+<p:sld xmlns:a="http://schemas.openxmlformats.org/drawingml/2006/main" xmlns:r="http://schemas.openxmlformats.org/officeDocument/2006/relationships" xmlns:p="http://schemas.openxmlformats.org/presentationml/2006/main">
+  <p:cSld>
+    <p:spTree>
+      <p:nvGrpSpPr>
+        <p:cNvPr id="1" name=""/>
+        <p:cNvGrpSpPr/>
+        <p:nvPr/>
+      </p:nvGrpSpPr>
+      <p:grpSpPr>
+        <a:xfrm>
+          <a:off x="0" y="0"/>
+          <a:ext cx="0" cy="0"/>
+          <a:chOff x="0" y="0"/>
+          <a:chExt cx="0" cy="0"/>
+        </a:xfrm>
+      </p:grpSpPr>
+      <p:sp>
+        <p:nvSpPr>
+          <p:cNvPr id="2" name="Title 1"/>
+          <p:cNvSpPr>
+            <a:spLocks noGrp="1"/>
+          </p:cNvSpPr>
+          <p:nvPr>
+            <p:ph type="ctrTitle"/>
+          </p:nvPr>
+        </p:nvSpPr>
+        <p:spPr/>
+        <p:txBody>
+          <a:bodyPr/>
+          <a:lstStyle/>
+          <a:p>
+            <a:r>
+              <a:rPr lang="en-US" dirty="0" smtClean="0"/>
+              <a:t>Hands-On Lab</a:t>
+            </a:r>
+            <a:endParaRPr lang="en-US" dirty="0"/>
+          </a:p>
+        </p:txBody>
+      </p:sp>
+      <p:sp>
+        <p:nvSpPr>
+          <p:cNvPr id="3" name="Subtitle 2"/>
+          <p:cNvSpPr>
+            <a:spLocks noGrp="1"/>
+          </p:cNvSpPr>
+          <p:nvPr>
+            <p:ph type="subTitle" idx="1"/>
+          </p:nvPr>
+        </p:nvSpPr>
+        <p:spPr>
+          <a:xfrm>
+            <a:off x="1889617" y="5630475"/>
+            <a:ext cx="4549819" cy="461665"/>
+          </a:xfrm>
+        </p:spPr>
+        <p:txBody>
+          <a:bodyPr/>
+          <a:lstStyle/>
+          <a:p>
+            <a:r>
+              <a:rPr lang="en-US" dirty="0" smtClean="0"/>
+              <a:t>HDInsight Spark HOL.html</a:t>
+            </a:r>
+            <a:endParaRPr lang="en-US" dirty="0"/>
+          </a:p>
+        </p:txBody>
+      </p:sp>
+      <p:sp>
+        <p:nvSpPr>
+          <p:cNvPr id="4" name="Text Placeholder 3"/>
+          <p:cNvSpPr>
+            <a:spLocks noGrp="1"/>
+          </p:cNvSpPr>
+          <p:nvPr>
+            <p:ph type="body" sz="quarter" idx="10"/>
+          </p:nvPr>
+        </p:nvSpPr>
+        <p:spPr>
+          <a:xfrm>
+            <a:off x="1889617" y="4160520"/>
+            <a:ext cx="10302383" cy="1274538"/>
+          </a:xfrm>
+        </p:spPr>
+        <p:txBody>
+          <a:bodyPr/>
+          <a:lstStyle/>
+          <a:p>
+            <a:r>
+              <a:rPr lang="en-US" dirty="0" smtClean="0"/>
+              <a:t>Apache Spark for Azure HDInsight</a:t>
+            </a:r>
+            <a:endParaRPr lang="en-US" dirty="0"/>
+          </a:p>
+        </p:txBody>
+      </p:sp>
+    </p:spTree>
+    <p:extLst>
+      <p:ext uri="{BB962C8B-B14F-4D97-AF65-F5344CB8AC3E}">
+        <p14:creationId xmlns:p14="http://schemas.microsoft.com/office/powerpoint/2010/main" val="2309216998"/>
+      </p:ext>
+    </p:extLst>
+  </p:cSld>
+  <p:clrMapOvr>
+    <a:masterClrMapping/>
+  </p:clrMapOvr>
+  <p:transition>
+    <p:fade/>
+  </p:transition>
+  <p:timing>
+    <p:tnLst>
+      <p:par>
+        <p:cTn id="1" dur="indefinite" restart="never" nodeType="tmRoot"/>
+      </p:par>
+    </p:tnLst>
+  </p:timing>
+</p:sld>
+</file>
+
+<file path=ppt/slides/slide11.xml><?xml version="1.0" encoding="utf-8"?>
+<p:sld xmlns:a="http://schemas.openxmlformats.org/drawingml/2006/main" xmlns:r="http://schemas.openxmlformats.org/officeDocument/2006/relationships" xmlns:p="http://schemas.openxmlformats.org/presentationml/2006/main">
+  <p:cSld>
+    <p:spTree>
+      <p:nvGrpSpPr>
+        <p:cNvPr id="1" name=""/>
+        <p:cNvGrpSpPr/>
+        <p:nvPr/>
+      </p:nvGrpSpPr>
+      <p:grpSpPr>
+        <a:xfrm>
+          <a:off x="0" y="0"/>
+          <a:ext cx="0" cy="0"/>
+          <a:chOff x="0" y="0"/>
+          <a:chExt cx="0" cy="0"/>
+        </a:xfrm>
+      </p:grpSpPr>
+    </p:spTree>
+    <p:extLst>
+      <p:ext uri="{BB962C8B-B14F-4D97-AF65-F5344CB8AC3E}">
+        <p14:creationId xmlns:p14="http://schemas.microsoft.com/office/powerpoint/2010/main" val="1908753786"/>
+      </p:ext>
+    </p:extLst>
+  </p:cSld>
+  <p:clrMapOvr>
+    <a:masterClrMapping/>
+  </p:clrMapOvr>
+  <p:transition>
+    <p:fade/>
+  </p:transition>
+  <p:timing>
+    <p:tnLst>
+      <p:par>
+        <p:cTn id="1" dur="indefinite" restart="never" nodeType="tmRoot"/>
+      </p:par>
+    </p:tnLst>
+  </p:timing>
+</p:sld>
+</file>
+
 <file path=ppt/slides/slide2.xml><?xml version="1.0" encoding="utf-8"?>
 <p:sld xmlns:a="http://schemas.openxmlformats.org/drawingml/2006/main" xmlns:r="http://schemas.openxmlformats.org/officeDocument/2006/relationships" xmlns:p="http://schemas.openxmlformats.org/presentationml/2006/main">
   <p:cSld>
@@ -11738,7 +12168,6 @@
               <a:rPr lang="en-US" dirty="0"/>
               <a:t>Big Data</a:t>
             </a:r>
-            <a:endParaRPr lang="en-US" dirty="0"/>
           </a:p>
         </p:txBody>
       </p:sp>
@@ -13747,7 +14176,7 @@
         <p:spPr>
           <a:xfrm>
             <a:off x="519248" y="1447800"/>
-            <a:ext cx="11151916" cy="4541500"/>
+            <a:ext cx="11151916" cy="4252318"/>
           </a:xfrm>
         </p:spPr>
         <p:txBody>
@@ -13778,13 +14207,13 @@
             <a:pPr lvl="1"/>
             <a:r>
               <a:rPr lang="en-US" dirty="0" smtClean="0"/>
-              <a:t>Uses Hadoop Distributed File System (HDFS) for storage and MapReduce for processing</a:t>
+              <a:t>Uses Hadoop Distributed File System (HDFS) for storage</a:t>
             </a:r>
           </a:p>
           <a:p>
             <a:r>
               <a:rPr lang="en-US" dirty="0" smtClean="0"/>
-              <a:t>Azure HDInsight employs the open-source Hortonworks</a:t>
+              <a:t>Employs the open-source Hortonworks</a:t>
             </a:r>
             <a:r>
               <a:rPr lang="en-US" dirty="0"/>
@@ -13796,21 +14225,61 @@
             </a:r>
           </a:p>
           <a:p>
-            <a:pPr marL="863341" lvl="2" indent="-460237"/>
+            <a:pPr lvl="1"/>
             <a:r>
               <a:rPr lang="en-US" dirty="0"/>
-              <a:t>Includes Hive, Pig, Storm, Spark, and more</a:t>
-            </a:r>
-          </a:p>
-          <a:p>
+              <a:t>Includes Hive, Pig, Storm, Spark, and </a:t>
+            </a:r>
             <a:r>
               <a:rPr lang="en-US" dirty="0" smtClean="0"/>
-              <a:t>Supports both Linux (Ubuntu Server) and Windows as cluster operating systems</a:t>
-            </a:r>
-            <a:endParaRPr lang="en-US" dirty="0"/>
+              <a:t>more</a:t>
+            </a:r>
+          </a:p>
+          <a:p>
+            <a:r>
+              <a:rPr lang="en-US" dirty="0" smtClean="0"/>
+              <a:t>Integrates with popular BI tools </a:t>
+            </a:r>
+          </a:p>
+          <a:p>
+            <a:pPr lvl="1"/>
+            <a:r>
+              <a:rPr lang="en-US" dirty="0" smtClean="0"/>
+              <a:t>Includes Power BI, Excel, SSAS, SSRS, Tableau</a:t>
+            </a:r>
           </a:p>
         </p:txBody>
       </p:sp>
+      <p:pic>
+        <p:nvPicPr>
+          <p:cNvPr id="4" name="Picture 3"/>
+          <p:cNvPicPr>
+            <a:picLocks noChangeAspect="1"/>
+          </p:cNvPicPr>
+          <p:nvPr/>
+        </p:nvPicPr>
+        <p:blipFill>
+          <a:blip r:embed="rId3" cstate="print">
+            <a:extLst>
+              <a:ext uri="{28A0092B-C50C-407E-A947-70E740481C1C}">
+                <a14:useLocalDpi xmlns:a14="http://schemas.microsoft.com/office/drawing/2010/main" val="0"/>
+              </a:ext>
+            </a:extLst>
+          </a:blip>
+          <a:stretch>
+            <a:fillRect/>
+          </a:stretch>
+        </p:blipFill>
+        <p:spPr>
+          <a:xfrm>
+            <a:off x="10538894" y="0"/>
+            <a:ext cx="1447800" cy="1447800"/>
+          </a:xfrm>
+          <a:prstGeom prst="rect">
+            <a:avLst/>
+          </a:prstGeom>
+        </p:spPr>
+      </p:pic>
     </p:spTree>
     <p:extLst>
       <p:ext uri="{BB962C8B-B14F-4D97-AF65-F5344CB8AC3E}">
@@ -13868,7 +14337,7 @@
           <a:p>
             <a:r>
               <a:rPr lang="en-US" dirty="0" smtClean="0"/>
-              <a:t>HDInsight Cluster Types</a:t>
+              <a:t>Why Hadoop on Azure?</a:t>
             </a:r>
             <a:endParaRPr lang="en-US" dirty="0"/>
           </a:p>
@@ -13887,7 +14356,7 @@
         <p:spPr>
           <a:xfrm>
             <a:off x="519248" y="1447800"/>
-            <a:ext cx="7518966" cy="4320029"/>
+            <a:ext cx="11151916" cy="4910832"/>
           </a:xfrm>
         </p:spPr>
         <p:txBody>
@@ -13896,92 +14365,92 @@
           <a:p>
             <a:r>
               <a:rPr lang="en-US" dirty="0" smtClean="0"/>
-              <a:t>Hadoop: Query workloads</a:t>
+              <a:t>Automatic cluster provisioning &amp; configuration</a:t>
             </a:r>
           </a:p>
           <a:p>
             <a:pPr lvl="1"/>
             <a:r>
               <a:rPr lang="en-US" dirty="0" smtClean="0"/>
-              <a:t>Reliable data storage, simple MapReduce</a:t>
-            </a:r>
-          </a:p>
-          <a:p>
-            <a:r>
-              <a:rPr lang="en-US" dirty="0" err="1" smtClean="0"/>
-              <a:t>HBase</a:t>
-            </a:r>
+              <a:t>Bypass an otherwise manual-intensive process</a:t>
+            </a:r>
+          </a:p>
+          <a:p>
             <a:r>
               <a:rPr lang="en-US" dirty="0" smtClean="0"/>
-              <a:t>: NoSQL workloads</a:t>
+              <a:t>Cluster scaling</a:t>
             </a:r>
           </a:p>
           <a:p>
             <a:pPr lvl="1"/>
             <a:r>
               <a:rPr lang="en-US" dirty="0" smtClean="0"/>
-              <a:t>Distributed database offering random access to large amounts of data</a:t>
-            </a:r>
-          </a:p>
-          <a:p>
+              <a:t>Change number of nodes without deleting/re-creating the cluster</a:t>
+            </a:r>
+          </a:p>
+          <a:p>
+            <a:r>
+              <a:rPr lang="en-US" dirty="0"/>
+              <a:t>High availability/reliability</a:t>
+            </a:r>
+          </a:p>
+          <a:p>
+            <a:pPr lvl="1"/>
             <a:r>
               <a:rPr lang="en-US" dirty="0" smtClean="0"/>
-              <a:t>Apache Storm: Stream workloads</a:t>
+              <a:t>Managed solution - 99.9% SLA</a:t>
             </a:r>
           </a:p>
           <a:p>
             <a:pPr lvl="1"/>
             <a:r>
               <a:rPr lang="en-US" dirty="0" smtClean="0"/>
-              <a:t>Real-time analysis of moving data streams</a:t>
+              <a:t>HDInsight </a:t>
+            </a:r>
+            <a:r>
+              <a:rPr lang="en-US" dirty="0"/>
+              <a:t>includes a secondary head node</a:t>
             </a:r>
           </a:p>
           <a:p>
             <a:r>
               <a:rPr lang="en-US" dirty="0" smtClean="0"/>
-              <a:t>Apache Spark: In-Memory Parallel Processing workloads</a:t>
-            </a:r>
+              <a:t>Reliable and economical storage</a:t>
+            </a:r>
+          </a:p>
+          <a:p>
+            <a:pPr lvl="1"/>
+            <a:r>
+              <a:rPr lang="en-US" dirty="0" smtClean="0"/>
+              <a:t>HDFS mapped over Azure Blob Storage</a:t>
+            </a:r>
+          </a:p>
+          <a:p>
+            <a:pPr lvl="1"/>
+            <a:r>
+              <a:rPr lang="en-US" dirty="0"/>
+              <a:t>Accessed through “</a:t>
+            </a:r>
+            <a:r>
+              <a:rPr lang="en-US" dirty="0" err="1"/>
+              <a:t>wasb</a:t>
+            </a:r>
+            <a:r>
+              <a:rPr lang="en-US" dirty="0"/>
+              <a:t>://” protocol </a:t>
+            </a:r>
+            <a:r>
+              <a:rPr lang="en-US" dirty="0" smtClean="0"/>
+              <a:t>prefix</a:t>
+            </a:r>
+            <a:endParaRPr lang="en-US" dirty="0"/>
           </a:p>
         </p:txBody>
       </p:sp>
-      <p:pic>
-        <p:nvPicPr>
-          <p:cNvPr id="4" name="Picture 3"/>
-          <p:cNvPicPr>
-            <a:picLocks noChangeAspect="1"/>
-          </p:cNvPicPr>
-          <p:nvPr/>
-        </p:nvPicPr>
-        <p:blipFill>
-          <a:blip r:embed="rId2"/>
-          <a:stretch>
-            <a:fillRect/>
-          </a:stretch>
-        </p:blipFill>
-        <p:spPr>
-          <a:xfrm>
-            <a:off x="8364500" y="1447800"/>
-            <a:ext cx="2990850" cy="4543425"/>
-          </a:xfrm>
-          <a:prstGeom prst="rect">
-            <a:avLst/>
-          </a:prstGeom>
-          <a:ln>
-            <a:noFill/>
-          </a:ln>
-          <a:effectLst>
-            <a:outerShdw blurRad="292100" dist="139700" dir="2700000" algn="tl" rotWithShape="0">
-              <a:srgbClr val="333333">
-                <a:alpha val="65000"/>
-              </a:srgbClr>
-            </a:outerShdw>
-          </a:effectLst>
-        </p:spPr>
-      </p:pic>
     </p:spTree>
     <p:extLst>
       <p:ext uri="{BB962C8B-B14F-4D97-AF65-F5344CB8AC3E}">
-        <p14:creationId xmlns:p14="http://schemas.microsoft.com/office/powerpoint/2010/main" val="1224957982"/>
+        <p14:creationId xmlns:p14="http://schemas.microsoft.com/office/powerpoint/2010/main" val="3554764023"/>
       </p:ext>
     </p:extLst>
   </p:cSld>
@@ -14035,7 +14504,7 @@
           <a:p>
             <a:r>
               <a:rPr lang="en-US" dirty="0" smtClean="0"/>
-              <a:t>Apache Spark for Azure HDInsight</a:t>
+              <a:t>HDInsight Cluster Types</a:t>
             </a:r>
             <a:endParaRPr lang="en-US" dirty="0"/>
           </a:p>
@@ -14054,7 +14523,7 @@
         <p:spPr>
           <a:xfrm>
             <a:off x="519248" y="1447800"/>
-            <a:ext cx="11151916" cy="2067746"/>
+            <a:ext cx="8553632" cy="4351961"/>
           </a:xfrm>
         </p:spPr>
         <p:txBody>
@@ -14062,100 +14531,102 @@
           <a:lstStyle/>
           <a:p>
             <a:r>
-              <a:rPr lang="en-US" dirty="0" smtClean="0"/>
-              <a:t>In-memory processing for really big data</a:t>
-            </a:r>
-          </a:p>
-          <a:p>
-            <a:r>
-              <a:rPr lang="en-US" dirty="0" smtClean="0"/>
-              <a:t>Provision a Spark cluster with a few button clicks</a:t>
+              <a:rPr lang="en-US" sz="3200" dirty="0" smtClean="0"/>
+              <a:t>Hadoop: Query workloads</a:t>
             </a:r>
           </a:p>
           <a:p>
             <a:pPr lvl="1"/>
             <a:r>
-              <a:rPr lang="en-US" dirty="0" smtClean="0"/>
-              <a:t>Includes Zeppelin, </a:t>
-            </a:r>
-            <a:r>
-              <a:rPr lang="en-US" dirty="0" err="1" smtClean="0"/>
-              <a:t>Jupyter</a:t>
-            </a:r>
-            <a:r>
-              <a:rPr lang="en-US" dirty="0" smtClean="0"/>
-              <a:t> (</a:t>
-            </a:r>
-            <a:r>
-              <a:rPr lang="en-US" dirty="0" err="1" smtClean="0"/>
-              <a:t>IPython</a:t>
-            </a:r>
-            <a:r>
-              <a:rPr lang="en-US" dirty="0" smtClean="0"/>
-              <a:t>), Spark SQL, </a:t>
-            </a:r>
-            <a:r>
-              <a:rPr lang="en-US" dirty="0" err="1" smtClean="0"/>
-              <a:t>MLib</a:t>
-            </a:r>
-            <a:r>
-              <a:rPr lang="en-US" dirty="0" smtClean="0"/>
-              <a:t>, and more</a:t>
-            </a:r>
-          </a:p>
-          <a:p>
-            <a:r>
-              <a:rPr lang="en-US" dirty="0" smtClean="0"/>
-              <a:t>Easily scale up or down as needed to meet demand</a:t>
-            </a:r>
-            <a:endParaRPr lang="en-US" dirty="0"/>
+              <a:rPr lang="en-US" sz="2800" dirty="0" smtClean="0"/>
+              <a:t>Reliable data storage, simple MapReduce</a:t>
+            </a:r>
+          </a:p>
+          <a:p>
+            <a:r>
+              <a:rPr lang="en-US" sz="3200" dirty="0" err="1" smtClean="0"/>
+              <a:t>HBase</a:t>
+            </a:r>
+            <a:r>
+              <a:rPr lang="en-US" sz="3200" dirty="0" smtClean="0"/>
+              <a:t>: NoSQL workloads</a:t>
+            </a:r>
+          </a:p>
+          <a:p>
+            <a:pPr lvl="1"/>
+            <a:r>
+              <a:rPr lang="en-US" sz="2800" dirty="0" smtClean="0"/>
+              <a:t>Distributed database offering random access to large amounts of data</a:t>
+            </a:r>
+          </a:p>
+          <a:p>
+            <a:r>
+              <a:rPr lang="en-US" sz="3200" dirty="0" smtClean="0"/>
+              <a:t>Apache Storm: Stream workloads</a:t>
+            </a:r>
+          </a:p>
+          <a:p>
+            <a:pPr lvl="1"/>
+            <a:r>
+              <a:rPr lang="en-US" sz="2800" dirty="0" smtClean="0"/>
+              <a:t>Real-time analysis of moving data streams</a:t>
+            </a:r>
+          </a:p>
+          <a:p>
+            <a:r>
+              <a:rPr lang="en-US" sz="3200" dirty="0" smtClean="0"/>
+              <a:t>Apache Spark: High-performance workloads</a:t>
+            </a:r>
+          </a:p>
+          <a:p>
+            <a:pPr lvl="1"/>
+            <a:r>
+              <a:rPr lang="en-US" sz="2800" dirty="0" smtClean="0"/>
+              <a:t>In-memory </a:t>
+            </a:r>
+            <a:r>
+              <a:rPr lang="en-US" sz="2800" dirty="0"/>
+              <a:t>p</a:t>
+            </a:r>
+            <a:r>
+              <a:rPr lang="en-US" sz="2800" dirty="0" smtClean="0"/>
+              <a:t>arallel processing</a:t>
+            </a:r>
           </a:p>
         </p:txBody>
       </p:sp>
       <p:pic>
         <p:nvPicPr>
-          <p:cNvPr id="4" name="Picture 3"/>
+          <p:cNvPr id="5" name="Picture 4"/>
           <p:cNvPicPr>
             <a:picLocks noChangeAspect="1"/>
           </p:cNvPicPr>
           <p:nvPr/>
         </p:nvPicPr>
-        <p:blipFill>
-          <a:blip r:embed="rId3">
-            <a:extLst>
-              <a:ext uri="{28A0092B-C50C-407E-A947-70E740481C1C}">
-                <a14:useLocalDpi xmlns:a14="http://schemas.microsoft.com/office/drawing/2010/main" val="0"/>
-              </a:ext>
-            </a:extLst>
-          </a:blip>
-          <a:stretch>
-            <a:fillRect/>
-          </a:stretch>
+        <p:blipFill rotWithShape="1">
+          <a:blip r:embed="rId3"/>
+          <a:srcRect r="45450"/>
+          <a:stretch/>
         </p:blipFill>
         <p:spPr>
           <a:xfrm>
-            <a:off x="3000375" y="3749014"/>
-            <a:ext cx="6191250" cy="2286000"/>
+            <a:off x="9072881" y="1447800"/>
+            <a:ext cx="2976880" cy="4685714"/>
           </a:xfrm>
           <a:prstGeom prst="rect">
             <a:avLst/>
           </a:prstGeom>
           <a:ln>
-            <a:noFill/>
+            <a:solidFill>
+              <a:schemeClr val="tx1"/>
+            </a:solidFill>
           </a:ln>
-          <a:effectLst>
-            <a:outerShdw blurRad="292100" dist="139700" dir="2700000" algn="tl" rotWithShape="0">
-              <a:srgbClr val="333333">
-                <a:alpha val="65000"/>
-              </a:srgbClr>
-            </a:outerShdw>
-          </a:effectLst>
         </p:spPr>
       </p:pic>
     </p:spTree>
     <p:extLst>
       <p:ext uri="{BB962C8B-B14F-4D97-AF65-F5344CB8AC3E}">
-        <p14:creationId xmlns:p14="http://schemas.microsoft.com/office/powerpoint/2010/main" val="3200283895"/>
+        <p14:creationId xmlns:p14="http://schemas.microsoft.com/office/powerpoint/2010/main" val="1224957982"/>
       </p:ext>
     </p:extLst>
   </p:cSld>
@@ -14165,6 +14636,13 @@
   <p:transition>
     <p:fade/>
   </p:transition>
+  <p:timing>
+    <p:tnLst>
+      <p:par>
+        <p:cTn id="1" dur="indefinite" restart="never" nodeType="tmRoot"/>
+      </p:par>
+    </p:tnLst>
+  </p:timing>
 </p:sld>
 </file>
 
@@ -14202,7 +14680,7 @@
           <a:p>
             <a:r>
               <a:rPr lang="en-US" dirty="0" smtClean="0"/>
-              <a:t>Items of Note About HDInsight</a:t>
+              <a:t>Apache Spark</a:t>
             </a:r>
             <a:endParaRPr lang="en-US" dirty="0"/>
           </a:p>
@@ -14221,7 +14699,7 @@
         <p:spPr>
           <a:xfrm>
             <a:off x="519248" y="1447800"/>
-            <a:ext cx="11151916" cy="4283096"/>
+            <a:ext cx="11151916" cy="4979697"/>
           </a:xfrm>
         </p:spPr>
         <p:txBody>
@@ -14229,92 +14707,125 @@
           <a:lstStyle/>
           <a:p>
             <a:r>
-              <a:rPr lang="en-US" dirty="0" smtClean="0"/>
-              <a:t>HDFS transparently mapped to Azure blob storage</a:t>
+              <a:rPr lang="en-US" sz="2800" dirty="0"/>
+              <a:t>Interactive manipulation and visualization of </a:t>
+            </a:r>
+            <a:r>
+              <a:rPr lang="en-US" sz="2800" dirty="0" smtClean="0"/>
+              <a:t>data</a:t>
             </a:r>
           </a:p>
           <a:p>
             <a:pPr lvl="1"/>
             <a:r>
-              <a:rPr lang="en-US" dirty="0" smtClean="0"/>
-              <a:t>Accessed through “</a:t>
-            </a:r>
-            <a:r>
-              <a:rPr lang="en-US" dirty="0" err="1" smtClean="0"/>
-              <a:t>wasb</a:t>
-            </a:r>
-            <a:r>
-              <a:rPr lang="en-US" dirty="0" smtClean="0"/>
-              <a:t>://” protocol prefix</a:t>
-            </a:r>
+              <a:rPr lang="en-US" sz="2400" dirty="0"/>
+              <a:t>Scala, Python, and R </a:t>
+            </a:r>
+            <a:r>
+              <a:rPr lang="en-US" sz="2400" dirty="0" smtClean="0"/>
+              <a:t>Interactive Shells</a:t>
+            </a:r>
+            <a:endParaRPr lang="en-US" sz="2400" dirty="0"/>
           </a:p>
           <a:p>
             <a:pPr lvl="1"/>
             <a:r>
-              <a:rPr lang="en-US" dirty="0" smtClean="0"/>
-              <a:t>Most HDFS commands work (except OS-specific ones like </a:t>
-            </a:r>
-            <a:r>
-              <a:rPr lang="en-US" dirty="0" err="1" smtClean="0"/>
-              <a:t>fschk</a:t>
-            </a:r>
-            <a:r>
-              <a:rPr lang="en-US" dirty="0" smtClean="0"/>
-              <a:t>)</a:t>
-            </a:r>
-          </a:p>
-          <a:p>
-            <a:r>
-              <a:rPr lang="en-US" dirty="0" smtClean="0"/>
-              <a:t>Can deploy from the portal, but often scripted in practice</a:t>
+              <a:rPr lang="en-US" sz="2400" dirty="0" err="1"/>
+              <a:t>Jupyter</a:t>
+            </a:r>
+            <a:r>
+              <a:rPr lang="en-US" sz="2400" dirty="0"/>
+              <a:t> Notebook with </a:t>
+            </a:r>
+            <a:r>
+              <a:rPr lang="en-US" sz="2400" dirty="0" err="1" smtClean="0"/>
+              <a:t>PySpark</a:t>
+            </a:r>
+            <a:r>
+              <a:rPr lang="en-US" sz="2400" dirty="0" smtClean="0"/>
+              <a:t> (Python) and Spark (Scala) kernels provide in-browser interaction</a:t>
+            </a:r>
+          </a:p>
+          <a:p>
+            <a:r>
+              <a:rPr lang="en-US" sz="2800" dirty="0" smtClean="0"/>
+              <a:t>Unified platform for processing multiple workloads</a:t>
             </a:r>
           </a:p>
           <a:p>
             <a:pPr lvl="1"/>
             <a:r>
-              <a:rPr lang="en-US" dirty="0" smtClean="0"/>
-              <a:t>Easier creation/deletion</a:t>
-            </a:r>
-          </a:p>
-          <a:p>
-            <a:r>
-              <a:rPr lang="en-US" dirty="0" smtClean="0"/>
-              <a:t>There is no “suspend” on HDInsight clusters</a:t>
+              <a:rPr lang="en-US" sz="2400" dirty="0" smtClean="0"/>
+              <a:t>Real-time processing, Machine Learning, Stream Analytics, Interactive Querying, Graphing</a:t>
+            </a:r>
+            <a:endParaRPr lang="en-US" sz="2400" dirty="0"/>
+          </a:p>
+          <a:p>
+            <a:r>
+              <a:rPr lang="en-US" sz="2800" dirty="0" smtClean="0"/>
+              <a:t>Leverages in-memory processing for really big data</a:t>
             </a:r>
           </a:p>
           <a:p>
             <a:pPr lvl="1"/>
             <a:r>
-              <a:rPr lang="en-US" dirty="0"/>
-              <a:t>D</a:t>
-            </a:r>
-            <a:r>
-              <a:rPr lang="en-US" dirty="0" smtClean="0"/>
-              <a:t>elete the cluster when finished to avoid unnecessary charges</a:t>
+              <a:rPr lang="en-US" sz="2400" dirty="0" smtClean="0"/>
+              <a:t>Resilient distributed datasets (RDDs)</a:t>
             </a:r>
           </a:p>
           <a:p>
             <a:pPr lvl="1"/>
             <a:r>
-              <a:rPr lang="en-US" dirty="0" smtClean="0"/>
-              <a:t>Data in blob storage stays behind </a:t>
-            </a:r>
-            <a:r>
-              <a:rPr lang="en-US" u="sng" dirty="0" smtClean="0"/>
-              <a:t>IF</a:t>
-            </a:r>
-            <a:r>
-              <a:rPr lang="en-US" dirty="0" smtClean="0"/>
-              <a:t> you use a separate storage account (i.e., storage account in different resource group)</a:t>
-            </a:r>
-            <a:endParaRPr lang="en-US" dirty="0"/>
+              <a:rPr lang="en-US" sz="2400" dirty="0" smtClean="0"/>
+              <a:t>APIs for processing large datasets</a:t>
+            </a:r>
+          </a:p>
+          <a:p>
+            <a:pPr lvl="1"/>
+            <a:r>
+              <a:rPr lang="en-US" sz="2400" dirty="0" smtClean="0"/>
+              <a:t>Up to 100x faster than Hadoop</a:t>
+            </a:r>
+          </a:p>
+          <a:p>
+            <a:endParaRPr lang="en-US" dirty="0" smtClean="0"/>
           </a:p>
         </p:txBody>
       </p:sp>
+      <p:pic>
+        <p:nvPicPr>
+          <p:cNvPr id="4" name="Picture 3"/>
+          <p:cNvPicPr>
+            <a:picLocks noChangeAspect="1"/>
+          </p:cNvPicPr>
+          <p:nvPr/>
+        </p:nvPicPr>
+        <p:blipFill>
+          <a:blip r:embed="rId3">
+            <a:extLst>
+              <a:ext uri="{28A0092B-C50C-407E-A947-70E740481C1C}">
+                <a14:useLocalDpi xmlns:a14="http://schemas.microsoft.com/office/drawing/2010/main" val="0"/>
+              </a:ext>
+            </a:extLst>
+          </a:blip>
+          <a:stretch>
+            <a:fillRect/>
+          </a:stretch>
+        </p:blipFill>
+        <p:spPr>
+          <a:xfrm>
+            <a:off x="10271760" y="0"/>
+            <a:ext cx="1920240" cy="974344"/>
+          </a:xfrm>
+          <a:prstGeom prst="rect">
+            <a:avLst/>
+          </a:prstGeom>
+        </p:spPr>
+      </p:pic>
     </p:spTree>
     <p:extLst>
       <p:ext uri="{BB962C8B-B14F-4D97-AF65-F5344CB8AC3E}">
-        <p14:creationId xmlns:p14="http://schemas.microsoft.com/office/powerpoint/2010/main" val="258416317"/>
+        <p14:creationId xmlns:p14="http://schemas.microsoft.com/office/powerpoint/2010/main" val="3200283895"/>
       </p:ext>
     </p:extLst>
   </p:cSld>
@@ -14358,7 +14869,7 @@
             <a:spLocks noGrp="1"/>
           </p:cNvSpPr>
           <p:nvPr>
-            <p:ph type="ctrTitle"/>
+            <p:ph type="title"/>
           </p:nvPr>
         </p:nvSpPr>
         <p:spPr/>
@@ -14368,7 +14879,7 @@
           <a:p>
             <a:r>
               <a:rPr lang="en-US" dirty="0" smtClean="0"/>
-              <a:t>Hands-On Lab</a:t>
+              <a:t>Spark Components on HDInsight</a:t>
             </a:r>
             <a:endParaRPr lang="en-US" dirty="0"/>
           </a:p>
@@ -14376,18 +14887,18 @@
       </p:sp>
       <p:sp>
         <p:nvSpPr>
-          <p:cNvPr id="3" name="Subtitle 2"/>
+          <p:cNvPr id="3" name="Content Placeholder 2"/>
           <p:cNvSpPr>
             <a:spLocks noGrp="1"/>
           </p:cNvSpPr>
           <p:nvPr>
-            <p:ph type="subTitle" idx="1"/>
+            <p:ph idx="1"/>
           </p:nvPr>
         </p:nvSpPr>
         <p:spPr>
           <a:xfrm>
-            <a:off x="1889617" y="5630475"/>
-            <a:ext cx="4549819" cy="461665"/>
+            <a:off x="519248" y="1447800"/>
+            <a:ext cx="6196512" cy="4780280"/>
           </a:xfrm>
         </p:spPr>
         <p:txBody>
@@ -14396,44 +14907,94 @@
           <a:p>
             <a:r>
               <a:rPr lang="en-US" dirty="0" smtClean="0"/>
-              <a:t>HDInsight Spark HOL.html</a:t>
+              <a:t>Spark Core</a:t>
+            </a:r>
+          </a:p>
+          <a:p>
+            <a:pPr lvl="1"/>
+            <a:r>
+              <a:rPr lang="en-US" dirty="0" smtClean="0"/>
+              <a:t>Includes Spark SQL, Spark Streaming, </a:t>
+            </a:r>
+            <a:r>
+              <a:rPr lang="en-US" dirty="0" err="1" smtClean="0"/>
+              <a:t>GraphX</a:t>
+            </a:r>
+            <a:r>
+              <a:rPr lang="en-US" dirty="0" smtClean="0"/>
+              <a:t>, and </a:t>
+            </a:r>
+            <a:r>
+              <a:rPr lang="en-US" dirty="0" err="1" smtClean="0"/>
+              <a:t>MLlib</a:t>
+            </a:r>
+            <a:endParaRPr lang="en-US" dirty="0" smtClean="0"/>
+          </a:p>
+          <a:p>
+            <a:r>
+              <a:rPr lang="en-US" dirty="0" smtClean="0"/>
+              <a:t>Anaconda</a:t>
+            </a:r>
+          </a:p>
+          <a:p>
+            <a:r>
+              <a:rPr lang="en-US" dirty="0" smtClean="0"/>
+              <a:t>Livy</a:t>
+            </a:r>
+          </a:p>
+          <a:p>
+            <a:r>
+              <a:rPr lang="en-US" dirty="0" err="1" smtClean="0"/>
+              <a:t>Jupyter</a:t>
+            </a:r>
+            <a:r>
+              <a:rPr lang="en-US" dirty="0" smtClean="0"/>
+              <a:t> Notebooks</a:t>
+            </a:r>
+          </a:p>
+          <a:p>
+            <a:r>
+              <a:rPr lang="en-US" dirty="0" smtClean="0"/>
+              <a:t>ODBC Driver for connecting from BI tools (Power BI, Tableau)</a:t>
             </a:r>
             <a:endParaRPr lang="en-US" dirty="0"/>
           </a:p>
         </p:txBody>
       </p:sp>
-      <p:sp>
-        <p:nvSpPr>
-          <p:cNvPr id="4" name="Text Placeholder 3"/>
-          <p:cNvSpPr>
-            <a:spLocks noGrp="1"/>
-          </p:cNvSpPr>
-          <p:nvPr>
-            <p:ph type="body" sz="quarter" idx="10"/>
-          </p:nvPr>
-        </p:nvSpPr>
+      <p:pic>
+        <p:nvPicPr>
+          <p:cNvPr id="4" name="Picture 3"/>
+          <p:cNvPicPr>
+            <a:picLocks noChangeAspect="1"/>
+          </p:cNvPicPr>
+          <p:nvPr/>
+        </p:nvPicPr>
+        <p:blipFill>
+          <a:blip r:embed="rId2">
+            <a:extLst>
+              <a:ext uri="{28A0092B-C50C-407E-A947-70E740481C1C}">
+                <a14:useLocalDpi xmlns:a14="http://schemas.microsoft.com/office/drawing/2010/main" val="0"/>
+              </a:ext>
+            </a:extLst>
+          </a:blip>
+          <a:stretch>
+            <a:fillRect/>
+          </a:stretch>
+        </p:blipFill>
         <p:spPr>
           <a:xfrm>
-            <a:off x="1889617" y="4160520"/>
-            <a:ext cx="10302383" cy="1274538"/>
+            <a:off x="6096000" y="1100137"/>
+            <a:ext cx="5934710" cy="5200848"/>
           </a:xfrm>
+          <a:prstGeom prst="rect">
+            <a:avLst/>
+          </a:prstGeom>
         </p:spPr>
-        <p:txBody>
-          <a:bodyPr/>
-          <a:lstStyle/>
-          <a:p>
-            <a:r>
-              <a:rPr lang="en-US" dirty="0" smtClean="0"/>
-              <a:t>Apache Spark for Azure HDInsight</a:t>
-            </a:r>
-            <a:endParaRPr lang="en-US" dirty="0"/>
-          </a:p>
-        </p:txBody>
-      </p:sp>
+      </p:pic>
     </p:spTree>
     <p:extLst>
       <p:ext uri="{BB962C8B-B14F-4D97-AF65-F5344CB8AC3E}">
-        <p14:creationId xmlns:p14="http://schemas.microsoft.com/office/powerpoint/2010/main" val="2309216998"/>
+        <p14:creationId xmlns:p14="http://schemas.microsoft.com/office/powerpoint/2010/main" val="1774019520"/>
       </p:ext>
     </p:extLst>
   </p:cSld>
@@ -14443,6 +15004,13 @@
   <p:transition>
     <p:fade/>
   </p:transition>
+  <p:timing>
+    <p:tnLst>
+      <p:par>
+        <p:cTn id="1" dur="indefinite" restart="never" nodeType="tmRoot"/>
+      </p:par>
+    </p:tnLst>
+  </p:timing>
 </p:sld>
 </file>
 
@@ -14463,10 +15031,245 @@
           <a:chExt cx="0" cy="0"/>
         </a:xfrm>
       </p:grpSpPr>
+      <p:sp>
+        <p:nvSpPr>
+          <p:cNvPr id="2" name="Title 1"/>
+          <p:cNvSpPr>
+            <a:spLocks noGrp="1"/>
+          </p:cNvSpPr>
+          <p:nvPr>
+            <p:ph type="title"/>
+          </p:nvPr>
+        </p:nvSpPr>
+        <p:spPr/>
+        <p:txBody>
+          <a:bodyPr/>
+          <a:lstStyle/>
+          <a:p>
+            <a:r>
+              <a:rPr lang="en-US" dirty="0" err="1" smtClean="0"/>
+              <a:t>Jupyter</a:t>
+            </a:r>
+            <a:r>
+              <a:rPr lang="en-US" dirty="0" smtClean="0"/>
+              <a:t> Notebooks on HDInsight</a:t>
+            </a:r>
+            <a:endParaRPr lang="en-US" dirty="0"/>
+          </a:p>
+        </p:txBody>
+      </p:sp>
+      <p:sp>
+        <p:nvSpPr>
+          <p:cNvPr id="3" name="Content Placeholder 2"/>
+          <p:cNvSpPr>
+            <a:spLocks noGrp="1"/>
+          </p:cNvSpPr>
+          <p:nvPr>
+            <p:ph idx="1"/>
+          </p:nvPr>
+        </p:nvSpPr>
+        <p:spPr>
+          <a:xfrm>
+            <a:off x="519248" y="1447800"/>
+            <a:ext cx="11151916" cy="1637371"/>
+          </a:xfrm>
+        </p:spPr>
+        <p:txBody>
+          <a:bodyPr/>
+          <a:lstStyle/>
+          <a:p>
+            <a:r>
+              <a:rPr lang="en-US" sz="2800" dirty="0" smtClean="0"/>
+              <a:t>Provide a browser-based interface for working with text, code, equations, plots, graphics, and interactive controls in a single document.</a:t>
+            </a:r>
+          </a:p>
+          <a:p>
+            <a:r>
+              <a:rPr lang="en-US" sz="2800" dirty="0" smtClean="0"/>
+              <a:t>Include preset Spark &amp; Hive contexts (</a:t>
+            </a:r>
+            <a:r>
+              <a:rPr lang="en-US" sz="2800" dirty="0" err="1" smtClean="0"/>
+              <a:t>sc</a:t>
+            </a:r>
+            <a:r>
+              <a:rPr lang="en-US" sz="2800" dirty="0" smtClean="0"/>
+              <a:t> &amp; </a:t>
+            </a:r>
+            <a:r>
+              <a:rPr lang="en-US" sz="2800" dirty="0" err="1" smtClean="0"/>
+              <a:t>sqlContext</a:t>
+            </a:r>
+            <a:r>
+              <a:rPr lang="en-US" sz="2800" dirty="0" smtClean="0"/>
+              <a:t>, respectively)</a:t>
+            </a:r>
+            <a:endParaRPr lang="en-US" sz="2800" dirty="0"/>
+          </a:p>
+        </p:txBody>
+      </p:sp>
+      <p:pic>
+        <p:nvPicPr>
+          <p:cNvPr id="5" name="Picture 4"/>
+          <p:cNvPicPr>
+            <a:picLocks noChangeAspect="1"/>
+          </p:cNvPicPr>
+          <p:nvPr/>
+        </p:nvPicPr>
+        <p:blipFill rotWithShape="1">
+          <a:blip r:embed="rId2"/>
+          <a:srcRect b="16273"/>
+          <a:stretch/>
+        </p:blipFill>
+        <p:spPr>
+          <a:xfrm>
+            <a:off x="590444" y="3506891"/>
+            <a:ext cx="11009524" cy="2822789"/>
+          </a:xfrm>
+          <a:prstGeom prst="rect">
+            <a:avLst/>
+          </a:prstGeom>
+          <a:ln>
+            <a:solidFill>
+              <a:schemeClr val="tx2"/>
+            </a:solidFill>
+          </a:ln>
+        </p:spPr>
+      </p:pic>
     </p:spTree>
     <p:extLst>
       <p:ext uri="{BB962C8B-B14F-4D97-AF65-F5344CB8AC3E}">
-        <p14:creationId xmlns:p14="http://schemas.microsoft.com/office/powerpoint/2010/main" val="1908753786"/>
+        <p14:creationId xmlns:p14="http://schemas.microsoft.com/office/powerpoint/2010/main" val="3879894912"/>
+      </p:ext>
+    </p:extLst>
+  </p:cSld>
+  <p:clrMapOvr>
+    <a:masterClrMapping/>
+  </p:clrMapOvr>
+  <p:transition>
+    <p:fade/>
+  </p:transition>
+  <p:timing>
+    <p:tnLst>
+      <p:par>
+        <p:cTn id="1" dur="indefinite" restart="never" nodeType="tmRoot"/>
+      </p:par>
+    </p:tnLst>
+  </p:timing>
+</p:sld>
+</file>
+
+<file path=ppt/slides/slide9.xml><?xml version="1.0" encoding="utf-8"?>
+<p:sld xmlns:a="http://schemas.openxmlformats.org/drawingml/2006/main" xmlns:r="http://schemas.openxmlformats.org/officeDocument/2006/relationships" xmlns:p="http://schemas.openxmlformats.org/presentationml/2006/main">
+  <p:cSld>
+    <p:spTree>
+      <p:nvGrpSpPr>
+        <p:cNvPr id="1" name=""/>
+        <p:cNvGrpSpPr/>
+        <p:nvPr/>
+      </p:nvGrpSpPr>
+      <p:grpSpPr>
+        <a:xfrm>
+          <a:off x="0" y="0"/>
+          <a:ext cx="0" cy="0"/>
+          <a:chOff x="0" y="0"/>
+          <a:chExt cx="0" cy="0"/>
+        </a:xfrm>
+      </p:grpSpPr>
+      <p:sp>
+        <p:nvSpPr>
+          <p:cNvPr id="2" name="Title 1"/>
+          <p:cNvSpPr>
+            <a:spLocks noGrp="1"/>
+          </p:cNvSpPr>
+          <p:nvPr>
+            <p:ph type="title"/>
+          </p:nvPr>
+        </p:nvSpPr>
+        <p:spPr/>
+        <p:txBody>
+          <a:bodyPr/>
+          <a:lstStyle/>
+          <a:p>
+            <a:r>
+              <a:rPr lang="en-US" dirty="0" smtClean="0"/>
+              <a:t>Items of Note About HDInsight</a:t>
+            </a:r>
+            <a:endParaRPr lang="en-US" dirty="0"/>
+          </a:p>
+        </p:txBody>
+      </p:sp>
+      <p:sp>
+        <p:nvSpPr>
+          <p:cNvPr id="3" name="Content Placeholder 2"/>
+          <p:cNvSpPr>
+            <a:spLocks noGrp="1"/>
+          </p:cNvSpPr>
+          <p:nvPr>
+            <p:ph idx="1"/>
+          </p:nvPr>
+        </p:nvSpPr>
+        <p:spPr>
+          <a:xfrm>
+            <a:off x="519248" y="1447800"/>
+            <a:ext cx="11151916" cy="3181512"/>
+          </a:xfrm>
+        </p:spPr>
+        <p:txBody>
+          <a:bodyPr/>
+          <a:lstStyle/>
+          <a:p>
+            <a:r>
+              <a:rPr lang="en-US" dirty="0" smtClean="0"/>
+              <a:t>There is no “suspend” on HDInsight clusters</a:t>
+            </a:r>
+          </a:p>
+          <a:p>
+            <a:pPr lvl="1"/>
+            <a:r>
+              <a:rPr lang="en-US" dirty="0" smtClean="0"/>
+              <a:t>Provision </a:t>
+            </a:r>
+            <a:r>
+              <a:rPr lang="en-US" dirty="0"/>
+              <a:t>the cluster, do work, </a:t>
+            </a:r>
+            <a:r>
+              <a:rPr lang="en-US" dirty="0" smtClean="0"/>
+              <a:t>then delete the cluster to avoid unnecessary charges</a:t>
+            </a:r>
+            <a:endParaRPr lang="en-US" dirty="0"/>
+          </a:p>
+          <a:p>
+            <a:pPr lvl="1"/>
+            <a:r>
+              <a:rPr lang="en-US" dirty="0"/>
+              <a:t>Storage can be decoupled from the cluster and reused across deployments</a:t>
+            </a:r>
+          </a:p>
+          <a:p>
+            <a:r>
+              <a:rPr lang="en-US" dirty="0" smtClean="0"/>
+              <a:t>Can </a:t>
+            </a:r>
+            <a:r>
+              <a:rPr lang="en-US" dirty="0"/>
+              <a:t>deploy from the portal, but often scripted in practice</a:t>
+            </a:r>
+          </a:p>
+          <a:p>
+            <a:pPr lvl="1"/>
+            <a:r>
+              <a:rPr lang="en-US" dirty="0" smtClean="0"/>
+              <a:t>Easier/repeatable creation and deletion</a:t>
+            </a:r>
+          </a:p>
+        </p:txBody>
+      </p:sp>
+    </p:spTree>
+    <p:extLst>
+      <p:ext uri="{BB962C8B-B14F-4D97-AF65-F5344CB8AC3E}">
+        <p14:creationId xmlns:p14="http://schemas.microsoft.com/office/powerpoint/2010/main" val="258416317"/>
       </p:ext>
     </p:extLst>
   </p:cSld>

</xml_diff>